<commit_message>
feat(ppt lambda): added reminder on fonctions syntax
</commit_message>
<xml_diff>
--- a/supports/source/02-FilterLambdaFctSup.pptx
+++ b/supports/source/02-FilterLambdaFctSup.pptx
@@ -6,9 +6,10 @@
   </p:sldMasterIdLst>
   <p:sldIdLst>
     <p:sldId id="256" r:id="rId2"/>
-    <p:sldId id="257" r:id="rId3"/>
-    <p:sldId id="258" r:id="rId4"/>
-    <p:sldId id="259" r:id="rId5"/>
+    <p:sldId id="260" r:id="rId3"/>
+    <p:sldId id="257" r:id="rId4"/>
+    <p:sldId id="258" r:id="rId5"/>
+    <p:sldId id="259" r:id="rId6"/>
   </p:sldIdLst>
   <p:sldSz cx="12192000" cy="6858000"/>
   <p:notesSz cx="6858000" cy="9144000"/>
@@ -107,6 +108,11 @@
       </a:defRPr>
     </a:lvl9pPr>
   </p:defaultTextStyle>
+  <p:extLst>
+    <p:ext uri="{EFAFB233-063F-42B5-8137-9DF3F51BA10A}">
+      <p15:sldGuideLst xmlns:p15="http://schemas.microsoft.com/office/powerpoint/2012/main"/>
+    </p:ext>
+  </p:extLst>
 </p:presentation>
 </file>
 
@@ -493,7 +499,7 @@
           <a:p>
             <a:fld id="{5AEE9901-D54F-483E-910A-A3C293F4A3A0}" type="datetimeFigureOut">
               <a:rPr lang="fr-CH" smtClean="0"/>
-              <a:t>04.09.2024</a:t>
+              <a:t>01.09.2025</a:t>
             </a:fld>
             <a:endParaRPr lang="fr-CH"/>
           </a:p>
@@ -780,7 +786,7 @@
           <a:p>
             <a:fld id="{5AEE9901-D54F-483E-910A-A3C293F4A3A0}" type="datetimeFigureOut">
               <a:rPr lang="fr-CH" smtClean="0"/>
-              <a:t>04.09.2024</a:t>
+              <a:t>01.09.2025</a:t>
             </a:fld>
             <a:endParaRPr lang="fr-CH"/>
           </a:p>
@@ -972,7 +978,7 @@
           <a:p>
             <a:fld id="{5AEE9901-D54F-483E-910A-A3C293F4A3A0}" type="datetimeFigureOut">
               <a:rPr lang="fr-CH" smtClean="0"/>
-              <a:t>04.09.2024</a:t>
+              <a:t>01.09.2025</a:t>
             </a:fld>
             <a:endParaRPr lang="fr-CH"/>
           </a:p>
@@ -1233,7 +1239,7 @@
           <a:p>
             <a:fld id="{5AEE9901-D54F-483E-910A-A3C293F4A3A0}" type="datetimeFigureOut">
               <a:rPr lang="fr-CH" smtClean="0"/>
-              <a:t>04.09.2024</a:t>
+              <a:t>01.09.2025</a:t>
             </a:fld>
             <a:endParaRPr lang="fr-CH"/>
           </a:p>
@@ -1657,7 +1663,7 @@
           <a:p>
             <a:fld id="{5AEE9901-D54F-483E-910A-A3C293F4A3A0}" type="datetimeFigureOut">
               <a:rPr lang="fr-CH" smtClean="0"/>
-              <a:t>04.09.2024</a:t>
+              <a:t>01.09.2025</a:t>
             </a:fld>
             <a:endParaRPr lang="fr-CH"/>
           </a:p>
@@ -2203,7 +2209,7 @@
           <a:p>
             <a:fld id="{5AEE9901-D54F-483E-910A-A3C293F4A3A0}" type="datetimeFigureOut">
               <a:rPr lang="fr-CH" smtClean="0"/>
-              <a:t>04.09.2024</a:t>
+              <a:t>01.09.2025</a:t>
             </a:fld>
             <a:endParaRPr lang="fr-CH"/>
           </a:p>
@@ -3043,7 +3049,7 @@
           <a:p>
             <a:fld id="{5AEE9901-D54F-483E-910A-A3C293F4A3A0}" type="datetimeFigureOut">
               <a:rPr lang="fr-CH" smtClean="0"/>
-              <a:t>04.09.2024</a:t>
+              <a:t>01.09.2025</a:t>
             </a:fld>
             <a:endParaRPr lang="fr-CH"/>
           </a:p>
@@ -3213,7 +3219,7 @@
           <a:p>
             <a:fld id="{5AEE9901-D54F-483E-910A-A3C293F4A3A0}" type="datetimeFigureOut">
               <a:rPr lang="fr-CH" smtClean="0"/>
-              <a:t>04.09.2024</a:t>
+              <a:t>01.09.2025</a:t>
             </a:fld>
             <a:endParaRPr lang="fr-CH"/>
           </a:p>
@@ -3397,7 +3403,7 @@
           <a:p>
             <a:fld id="{5AEE9901-D54F-483E-910A-A3C293F4A3A0}" type="datetimeFigureOut">
               <a:rPr lang="fr-CH" smtClean="0"/>
-              <a:t>04.09.2024</a:t>
+              <a:t>01.09.2025</a:t>
             </a:fld>
             <a:endParaRPr lang="fr-CH"/>
           </a:p>
@@ -3567,7 +3573,7 @@
           <a:p>
             <a:fld id="{5AEE9901-D54F-483E-910A-A3C293F4A3A0}" type="datetimeFigureOut">
               <a:rPr lang="fr-CH" smtClean="0"/>
-              <a:t>04.09.2024</a:t>
+              <a:t>01.09.2025</a:t>
             </a:fld>
             <a:endParaRPr lang="fr-CH"/>
           </a:p>
@@ -3815,7 +3821,7 @@
           <a:p>
             <a:fld id="{5AEE9901-D54F-483E-910A-A3C293F4A3A0}" type="datetimeFigureOut">
               <a:rPr lang="fr-CH" smtClean="0"/>
-              <a:t>04.09.2024</a:t>
+              <a:t>01.09.2025</a:t>
             </a:fld>
             <a:endParaRPr lang="fr-CH"/>
           </a:p>
@@ -4052,7 +4058,7 @@
           <a:p>
             <a:fld id="{5AEE9901-D54F-483E-910A-A3C293F4A3A0}" type="datetimeFigureOut">
               <a:rPr lang="fr-CH" smtClean="0"/>
-              <a:t>04.09.2024</a:t>
+              <a:t>01.09.2025</a:t>
             </a:fld>
             <a:endParaRPr lang="fr-CH"/>
           </a:p>
@@ -4425,7 +4431,7 @@
           <a:p>
             <a:fld id="{5AEE9901-D54F-483E-910A-A3C293F4A3A0}" type="datetimeFigureOut">
               <a:rPr lang="fr-CH" smtClean="0"/>
-              <a:t>04.09.2024</a:t>
+              <a:t>01.09.2025</a:t>
             </a:fld>
             <a:endParaRPr lang="fr-CH"/>
           </a:p>
@@ -4543,7 +4549,7 @@
           <a:p>
             <a:fld id="{5AEE9901-D54F-483E-910A-A3C293F4A3A0}" type="datetimeFigureOut">
               <a:rPr lang="fr-CH" smtClean="0"/>
-              <a:t>04.09.2024</a:t>
+              <a:t>01.09.2025</a:t>
             </a:fld>
             <a:endParaRPr lang="fr-CH"/>
           </a:p>
@@ -4638,7 +4644,7 @@
           <a:p>
             <a:fld id="{5AEE9901-D54F-483E-910A-A3C293F4A3A0}" type="datetimeFigureOut">
               <a:rPr lang="fr-CH" smtClean="0"/>
-              <a:t>04.09.2024</a:t>
+              <a:t>01.09.2025</a:t>
             </a:fld>
             <a:endParaRPr lang="fr-CH"/>
           </a:p>
@@ -4889,7 +4895,7 @@
           <a:p>
             <a:fld id="{5AEE9901-D54F-483E-910A-A3C293F4A3A0}" type="datetimeFigureOut">
               <a:rPr lang="fr-CH" smtClean="0"/>
-              <a:t>04.09.2024</a:t>
+              <a:t>01.09.2025</a:t>
             </a:fld>
             <a:endParaRPr lang="fr-CH"/>
           </a:p>
@@ -5176,7 +5182,7 @@
           <a:p>
             <a:fld id="{5AEE9901-D54F-483E-910A-A3C293F4A3A0}" type="datetimeFigureOut">
               <a:rPr lang="fr-CH" smtClean="0"/>
-              <a:t>04.09.2024</a:t>
+              <a:t>01.09.2025</a:t>
             </a:fld>
             <a:endParaRPr lang="fr-CH"/>
           </a:p>
@@ -5389,7 +5395,7 @@
           <a:p>
             <a:fld id="{5AEE9901-D54F-483E-910A-A3C293F4A3A0}" type="datetimeFigureOut">
               <a:rPr lang="fr-CH" smtClean="0"/>
-              <a:t>04.09.2024</a:t>
+              <a:t>01.09.2025</a:t>
             </a:fld>
             <a:endParaRPr lang="fr-CH"/>
           </a:p>
@@ -5940,6 +5946,592 @@
 </file>
 
 <file path=ppt/slides/slide2.xml><?xml version="1.0" encoding="utf-8"?>
+<p:sld xmlns:a="http://schemas.openxmlformats.org/drawingml/2006/main" xmlns:r="http://schemas.openxmlformats.org/officeDocument/2006/relationships" xmlns:p="http://schemas.openxmlformats.org/presentationml/2006/main">
+  <p:cSld>
+    <p:spTree>
+      <p:nvGrpSpPr>
+        <p:cNvPr id="1" name=""/>
+        <p:cNvGrpSpPr/>
+        <p:nvPr/>
+      </p:nvGrpSpPr>
+      <p:grpSpPr>
+        <a:xfrm>
+          <a:off x="0" y="0"/>
+          <a:ext cx="0" cy="0"/>
+          <a:chOff x="0" y="0"/>
+          <a:chExt cx="0" cy="0"/>
+        </a:xfrm>
+      </p:grpSpPr>
+      <p:sp>
+        <p:nvSpPr>
+          <p:cNvPr id="2" name="Titre 1">
+            <a:extLst>
+              <a:ext uri="{FF2B5EF4-FFF2-40B4-BE49-F238E27FC236}">
+                <a16:creationId xmlns:a16="http://schemas.microsoft.com/office/drawing/2014/main" id="{4D65ED58-0AE1-E506-F113-AB8BA3D40ED0}"/>
+              </a:ext>
+            </a:extLst>
+          </p:cNvPr>
+          <p:cNvSpPr>
+            <a:spLocks noGrp="1"/>
+          </p:cNvSpPr>
+          <p:nvPr>
+            <p:ph type="title"/>
+          </p:nvPr>
+        </p:nvSpPr>
+        <p:spPr/>
+        <p:txBody>
+          <a:bodyPr/>
+          <a:lstStyle/>
+          <a:p>
+            <a:r>
+              <a:rPr lang="fr-CH" dirty="0"/>
+              <a:t>Rappel sur les fonctions en </a:t>
+            </a:r>
+            <a:r>
+              <a:rPr lang="fr-CH" dirty="0" err="1"/>
+              <a:t>c#</a:t>
+            </a:r>
+            <a:endParaRPr lang="fr-CH" dirty="0"/>
+          </a:p>
+        </p:txBody>
+      </p:sp>
+      <p:sp>
+        <p:nvSpPr>
+          <p:cNvPr id="3" name="Espace réservé du contenu 2">
+            <a:extLst>
+              <a:ext uri="{FF2B5EF4-FFF2-40B4-BE49-F238E27FC236}">
+                <a16:creationId xmlns:a16="http://schemas.microsoft.com/office/drawing/2014/main" id="{D6DDFD0E-F0E9-EC1C-7C30-379F5FBB4C1C}"/>
+              </a:ext>
+            </a:extLst>
+          </p:cNvPr>
+          <p:cNvSpPr>
+            <a:spLocks noGrp="1"/>
+          </p:cNvSpPr>
+          <p:nvPr>
+            <p:ph idx="1"/>
+          </p:nvPr>
+        </p:nvSpPr>
+        <p:spPr/>
+        <p:txBody>
+          <a:bodyPr/>
+          <a:lstStyle/>
+          <a:p>
+            <a:r>
+              <a:rPr lang="fr-CH" dirty="0"/>
+              <a:t>Syntaxe générale</a:t>
+            </a:r>
+          </a:p>
+          <a:p>
+            <a:endParaRPr lang="fr-CH" dirty="0"/>
+          </a:p>
+          <a:p>
+            <a:endParaRPr lang="fr-CH" dirty="0"/>
+          </a:p>
+          <a:p>
+            <a:r>
+              <a:rPr lang="fr-CH" dirty="0"/>
+              <a:t>Exemple</a:t>
+            </a:r>
+          </a:p>
+          <a:p>
+            <a:pPr marL="0" indent="0">
+              <a:buNone/>
+            </a:pPr>
+            <a:r>
+              <a:rPr lang="fr-CH" sz="2800" dirty="0"/>
+              <a:t>	</a:t>
+            </a:r>
+            <a:r>
+              <a:rPr lang="fr-CH" sz="2800" dirty="0">
+                <a:highlight>
+                  <a:srgbClr val="808080"/>
+                </a:highlight>
+              </a:rPr>
+              <a:t>public   </a:t>
+            </a:r>
+            <a:r>
+              <a:rPr lang="fr-CH" sz="2800" dirty="0" err="1">
+                <a:highlight>
+                  <a:srgbClr val="808080"/>
+                </a:highlight>
+              </a:rPr>
+              <a:t>void</a:t>
+            </a:r>
+            <a:r>
+              <a:rPr lang="fr-CH" sz="2800" dirty="0">
+                <a:highlight>
+                  <a:srgbClr val="808080"/>
+                </a:highlight>
+              </a:rPr>
+              <a:t>  </a:t>
+            </a:r>
+            <a:r>
+              <a:rPr lang="fr-CH" sz="2800" dirty="0" err="1">
+                <a:highlight>
+                  <a:srgbClr val="808080"/>
+                </a:highlight>
+              </a:rPr>
+              <a:t>WriteLine</a:t>
+            </a:r>
+            <a:r>
+              <a:rPr lang="fr-CH" sz="2800" dirty="0">
+                <a:highlight>
+                  <a:srgbClr val="808080"/>
+                </a:highlight>
+              </a:rPr>
+              <a:t> (string message)</a:t>
+            </a:r>
+          </a:p>
+          <a:p>
+            <a:endParaRPr lang="fr-CH" dirty="0"/>
+          </a:p>
+          <a:p>
+            <a:endParaRPr lang="fr-CH" dirty="0"/>
+          </a:p>
+        </p:txBody>
+      </p:sp>
+      <p:pic>
+        <p:nvPicPr>
+          <p:cNvPr id="5" name="Image 4">
+            <a:extLst>
+              <a:ext uri="{FF2B5EF4-FFF2-40B4-BE49-F238E27FC236}">
+                <a16:creationId xmlns:a16="http://schemas.microsoft.com/office/drawing/2014/main" id="{2DA7A498-4A00-15A5-3DC2-D5C4F3605D41}"/>
+              </a:ext>
+            </a:extLst>
+          </p:cNvPr>
+          <p:cNvPicPr>
+            <a:picLocks noChangeAspect="1"/>
+          </p:cNvPicPr>
+          <p:nvPr/>
+        </p:nvPicPr>
+        <p:blipFill>
+          <a:blip r:embed="rId2"/>
+          <a:stretch>
+            <a:fillRect/>
+          </a:stretch>
+        </p:blipFill>
+        <p:spPr>
+          <a:xfrm>
+            <a:off x="1299843" y="2600981"/>
+            <a:ext cx="7644789" cy="558597"/>
+          </a:xfrm>
+          <a:prstGeom prst="rect">
+            <a:avLst/>
+          </a:prstGeom>
+        </p:spPr>
+      </p:pic>
+      <p:cxnSp>
+        <p:nvCxnSpPr>
+          <p:cNvPr id="7" name="Connecteur droit avec flèche 6">
+            <a:extLst>
+              <a:ext uri="{FF2B5EF4-FFF2-40B4-BE49-F238E27FC236}">
+                <a16:creationId xmlns:a16="http://schemas.microsoft.com/office/drawing/2014/main" id="{8BA54C63-09DA-2CB9-6DC0-D45A7387486C}"/>
+              </a:ext>
+            </a:extLst>
+          </p:cNvPr>
+          <p:cNvCxnSpPr/>
+          <p:nvPr/>
+        </p:nvCxnSpPr>
+        <p:spPr>
+          <a:xfrm>
+            <a:off x="2147207" y="2971800"/>
+            <a:ext cx="383722" cy="1240971"/>
+          </a:xfrm>
+          <a:prstGeom prst="straightConnector1">
+            <a:avLst/>
+          </a:prstGeom>
+          <a:ln>
+            <a:tailEnd type="triangle"/>
+          </a:ln>
+        </p:spPr>
+        <p:style>
+          <a:lnRef idx="1">
+            <a:schemeClr val="accent1"/>
+          </a:lnRef>
+          <a:fillRef idx="0">
+            <a:schemeClr val="accent1"/>
+          </a:fillRef>
+          <a:effectRef idx="0">
+            <a:schemeClr val="accent1"/>
+          </a:effectRef>
+          <a:fontRef idx="minor">
+            <a:schemeClr val="tx1"/>
+          </a:fontRef>
+        </p:style>
+      </p:cxnSp>
+      <p:cxnSp>
+        <p:nvCxnSpPr>
+          <p:cNvPr id="9" name="Connecteur droit avec flèche 8">
+            <a:extLst>
+              <a:ext uri="{FF2B5EF4-FFF2-40B4-BE49-F238E27FC236}">
+                <a16:creationId xmlns:a16="http://schemas.microsoft.com/office/drawing/2014/main" id="{DEF227DC-7A11-0509-DA9A-1944FF47D94D}"/>
+              </a:ext>
+            </a:extLst>
+          </p:cNvPr>
+          <p:cNvCxnSpPr/>
+          <p:nvPr/>
+        </p:nvCxnSpPr>
+        <p:spPr>
+          <a:xfrm>
+            <a:off x="3600450" y="2988129"/>
+            <a:ext cx="0" cy="1289957"/>
+          </a:xfrm>
+          <a:prstGeom prst="straightConnector1">
+            <a:avLst/>
+          </a:prstGeom>
+          <a:ln>
+            <a:tailEnd type="triangle"/>
+          </a:ln>
+        </p:spPr>
+        <p:style>
+          <a:lnRef idx="1">
+            <a:schemeClr val="accent1"/>
+          </a:lnRef>
+          <a:fillRef idx="0">
+            <a:schemeClr val="accent1"/>
+          </a:fillRef>
+          <a:effectRef idx="0">
+            <a:schemeClr val="accent1"/>
+          </a:effectRef>
+          <a:fontRef idx="minor">
+            <a:schemeClr val="tx1"/>
+          </a:fontRef>
+        </p:style>
+      </p:cxnSp>
+      <p:cxnSp>
+        <p:nvCxnSpPr>
+          <p:cNvPr id="11" name="Connecteur droit avec flèche 10">
+            <a:extLst>
+              <a:ext uri="{FF2B5EF4-FFF2-40B4-BE49-F238E27FC236}">
+                <a16:creationId xmlns:a16="http://schemas.microsoft.com/office/drawing/2014/main" id="{B8568308-8278-D54F-CFFD-6259B0D4B2DF}"/>
+              </a:ext>
+            </a:extLst>
+          </p:cNvPr>
+          <p:cNvCxnSpPr/>
+          <p:nvPr/>
+        </p:nvCxnSpPr>
+        <p:spPr>
+          <a:xfrm flipH="1">
+            <a:off x="5021036" y="2971800"/>
+            <a:ext cx="612321" cy="1240971"/>
+          </a:xfrm>
+          <a:prstGeom prst="straightConnector1">
+            <a:avLst/>
+          </a:prstGeom>
+          <a:ln>
+            <a:tailEnd type="triangle"/>
+          </a:ln>
+        </p:spPr>
+        <p:style>
+          <a:lnRef idx="1">
+            <a:schemeClr val="accent1"/>
+          </a:lnRef>
+          <a:fillRef idx="0">
+            <a:schemeClr val="accent1"/>
+          </a:fillRef>
+          <a:effectRef idx="0">
+            <a:schemeClr val="accent1"/>
+          </a:effectRef>
+          <a:fontRef idx="minor">
+            <a:schemeClr val="tx1"/>
+          </a:fontRef>
+        </p:style>
+      </p:cxnSp>
+      <p:cxnSp>
+        <p:nvCxnSpPr>
+          <p:cNvPr id="13" name="Connecteur droit avec flèche 12">
+            <a:extLst>
+              <a:ext uri="{FF2B5EF4-FFF2-40B4-BE49-F238E27FC236}">
+                <a16:creationId xmlns:a16="http://schemas.microsoft.com/office/drawing/2014/main" id="{F1721458-9923-CFD2-F3ED-2D868785DD05}"/>
+              </a:ext>
+            </a:extLst>
+          </p:cNvPr>
+          <p:cNvCxnSpPr/>
+          <p:nvPr/>
+        </p:nvCxnSpPr>
+        <p:spPr>
+          <a:xfrm flipH="1">
+            <a:off x="7062107" y="2988129"/>
+            <a:ext cx="498022" cy="1249135"/>
+          </a:xfrm>
+          <a:prstGeom prst="straightConnector1">
+            <a:avLst/>
+          </a:prstGeom>
+          <a:ln>
+            <a:tailEnd type="triangle"/>
+          </a:ln>
+        </p:spPr>
+        <p:style>
+          <a:lnRef idx="1">
+            <a:schemeClr val="accent1"/>
+          </a:lnRef>
+          <a:fillRef idx="0">
+            <a:schemeClr val="accent1"/>
+          </a:fillRef>
+          <a:effectRef idx="0">
+            <a:schemeClr val="accent1"/>
+          </a:effectRef>
+          <a:fontRef idx="minor">
+            <a:schemeClr val="tx1"/>
+          </a:fontRef>
+        </p:style>
+      </p:cxnSp>
+    </p:spTree>
+    <p:extLst>
+      <p:ext uri="{BB962C8B-B14F-4D97-AF65-F5344CB8AC3E}">
+        <p14:creationId xmlns:p14="http://schemas.microsoft.com/office/powerpoint/2010/main" val="2215086612"/>
+      </p:ext>
+    </p:extLst>
+  </p:cSld>
+  <p:clrMapOvr>
+    <a:masterClrMapping/>
+  </p:clrMapOvr>
+  <p:timing>
+    <p:tnLst>
+      <p:par>
+        <p:cTn id="1" dur="indefinite" restart="never" nodeType="tmRoot">
+          <p:childTnLst>
+            <p:seq concurrent="1" nextAc="seek">
+              <p:cTn id="2" dur="indefinite" nodeType="mainSeq">
+                <p:childTnLst>
+                  <p:par>
+                    <p:cTn id="3" fill="hold">
+                      <p:stCondLst>
+                        <p:cond delay="indefinite"/>
+                      </p:stCondLst>
+                      <p:childTnLst>
+                        <p:par>
+                          <p:cTn id="4" fill="hold">
+                            <p:stCondLst>
+                              <p:cond delay="0"/>
+                            </p:stCondLst>
+                            <p:childTnLst>
+                              <p:par>
+                                <p:cTn id="5" presetID="22" presetClass="entr" presetSubtype="1" fill="hold" nodeType="clickEffect">
+                                  <p:stCondLst>
+                                    <p:cond delay="0"/>
+                                  </p:stCondLst>
+                                  <p:childTnLst>
+                                    <p:set>
+                                      <p:cBhvr>
+                                        <p:cTn id="6" dur="1" fill="hold">
+                                          <p:stCondLst>
+                                            <p:cond delay="0"/>
+                                          </p:stCondLst>
+                                        </p:cTn>
+                                        <p:tgtEl>
+                                          <p:spTgt spid="7"/>
+                                        </p:tgtEl>
+                                        <p:attrNameLst>
+                                          <p:attrName>style.visibility</p:attrName>
+                                        </p:attrNameLst>
+                                      </p:cBhvr>
+                                      <p:to>
+                                        <p:strVal val="visible"/>
+                                      </p:to>
+                                    </p:set>
+                                    <p:animEffect transition="in" filter="wipe(up)">
+                                      <p:cBhvr>
+                                        <p:cTn id="7" dur="500"/>
+                                        <p:tgtEl>
+                                          <p:spTgt spid="7"/>
+                                        </p:tgtEl>
+                                      </p:cBhvr>
+                                    </p:animEffect>
+                                  </p:childTnLst>
+                                </p:cTn>
+                              </p:par>
+                            </p:childTnLst>
+                          </p:cTn>
+                        </p:par>
+                      </p:childTnLst>
+                    </p:cTn>
+                  </p:par>
+                  <p:par>
+                    <p:cTn id="8" fill="hold">
+                      <p:stCondLst>
+                        <p:cond delay="indefinite"/>
+                      </p:stCondLst>
+                      <p:childTnLst>
+                        <p:par>
+                          <p:cTn id="9" fill="hold">
+                            <p:stCondLst>
+                              <p:cond delay="0"/>
+                            </p:stCondLst>
+                            <p:childTnLst>
+                              <p:par>
+                                <p:cTn id="10" presetID="22" presetClass="entr" presetSubtype="1" fill="hold" nodeType="clickEffect">
+                                  <p:stCondLst>
+                                    <p:cond delay="0"/>
+                                  </p:stCondLst>
+                                  <p:childTnLst>
+                                    <p:set>
+                                      <p:cBhvr>
+                                        <p:cTn id="11" dur="1" fill="hold">
+                                          <p:stCondLst>
+                                            <p:cond delay="0"/>
+                                          </p:stCondLst>
+                                        </p:cTn>
+                                        <p:tgtEl>
+                                          <p:spTgt spid="9"/>
+                                        </p:tgtEl>
+                                        <p:attrNameLst>
+                                          <p:attrName>style.visibility</p:attrName>
+                                        </p:attrNameLst>
+                                      </p:cBhvr>
+                                      <p:to>
+                                        <p:strVal val="visible"/>
+                                      </p:to>
+                                    </p:set>
+                                    <p:animEffect transition="in" filter="wipe(up)">
+                                      <p:cBhvr>
+                                        <p:cTn id="12" dur="500"/>
+                                        <p:tgtEl>
+                                          <p:spTgt spid="9"/>
+                                        </p:tgtEl>
+                                      </p:cBhvr>
+                                    </p:animEffect>
+                                  </p:childTnLst>
+                                </p:cTn>
+                              </p:par>
+                            </p:childTnLst>
+                          </p:cTn>
+                        </p:par>
+                      </p:childTnLst>
+                    </p:cTn>
+                  </p:par>
+                  <p:par>
+                    <p:cTn id="13" fill="hold">
+                      <p:stCondLst>
+                        <p:cond delay="indefinite"/>
+                      </p:stCondLst>
+                      <p:childTnLst>
+                        <p:par>
+                          <p:cTn id="14" fill="hold">
+                            <p:stCondLst>
+                              <p:cond delay="0"/>
+                            </p:stCondLst>
+                            <p:childTnLst>
+                              <p:par>
+                                <p:cTn id="15" presetID="22" presetClass="entr" presetSubtype="1" fill="hold" nodeType="clickEffect">
+                                  <p:stCondLst>
+                                    <p:cond delay="0"/>
+                                  </p:stCondLst>
+                                  <p:childTnLst>
+                                    <p:set>
+                                      <p:cBhvr>
+                                        <p:cTn id="16" dur="1" fill="hold">
+                                          <p:stCondLst>
+                                            <p:cond delay="0"/>
+                                          </p:stCondLst>
+                                        </p:cTn>
+                                        <p:tgtEl>
+                                          <p:spTgt spid="11"/>
+                                        </p:tgtEl>
+                                        <p:attrNameLst>
+                                          <p:attrName>style.visibility</p:attrName>
+                                        </p:attrNameLst>
+                                      </p:cBhvr>
+                                      <p:to>
+                                        <p:strVal val="visible"/>
+                                      </p:to>
+                                    </p:set>
+                                    <p:animEffect transition="in" filter="wipe(up)">
+                                      <p:cBhvr>
+                                        <p:cTn id="17" dur="500"/>
+                                        <p:tgtEl>
+                                          <p:spTgt spid="11"/>
+                                        </p:tgtEl>
+                                      </p:cBhvr>
+                                    </p:animEffect>
+                                  </p:childTnLst>
+                                </p:cTn>
+                              </p:par>
+                            </p:childTnLst>
+                          </p:cTn>
+                        </p:par>
+                      </p:childTnLst>
+                    </p:cTn>
+                  </p:par>
+                  <p:par>
+                    <p:cTn id="18" fill="hold">
+                      <p:stCondLst>
+                        <p:cond delay="indefinite"/>
+                      </p:stCondLst>
+                      <p:childTnLst>
+                        <p:par>
+                          <p:cTn id="19" fill="hold">
+                            <p:stCondLst>
+                              <p:cond delay="0"/>
+                            </p:stCondLst>
+                            <p:childTnLst>
+                              <p:par>
+                                <p:cTn id="20" presetID="22" presetClass="entr" presetSubtype="1" fill="hold" nodeType="clickEffect">
+                                  <p:stCondLst>
+                                    <p:cond delay="0"/>
+                                  </p:stCondLst>
+                                  <p:childTnLst>
+                                    <p:set>
+                                      <p:cBhvr>
+                                        <p:cTn id="21" dur="1" fill="hold">
+                                          <p:stCondLst>
+                                            <p:cond delay="0"/>
+                                          </p:stCondLst>
+                                        </p:cTn>
+                                        <p:tgtEl>
+                                          <p:spTgt spid="13"/>
+                                        </p:tgtEl>
+                                        <p:attrNameLst>
+                                          <p:attrName>style.visibility</p:attrName>
+                                        </p:attrNameLst>
+                                      </p:cBhvr>
+                                      <p:to>
+                                        <p:strVal val="visible"/>
+                                      </p:to>
+                                    </p:set>
+                                    <p:animEffect transition="in" filter="wipe(up)">
+                                      <p:cBhvr>
+                                        <p:cTn id="22" dur="500"/>
+                                        <p:tgtEl>
+                                          <p:spTgt spid="13"/>
+                                        </p:tgtEl>
+                                      </p:cBhvr>
+                                    </p:animEffect>
+                                  </p:childTnLst>
+                                </p:cTn>
+                              </p:par>
+                            </p:childTnLst>
+                          </p:cTn>
+                        </p:par>
+                      </p:childTnLst>
+                    </p:cTn>
+                  </p:par>
+                </p:childTnLst>
+              </p:cTn>
+              <p:prevCondLst>
+                <p:cond evt="onPrev" delay="0">
+                  <p:tgtEl>
+                    <p:sldTgt/>
+                  </p:tgtEl>
+                </p:cond>
+              </p:prevCondLst>
+              <p:nextCondLst>
+                <p:cond evt="onNext" delay="0">
+                  <p:tgtEl>
+                    <p:sldTgt/>
+                  </p:tgtEl>
+                </p:cond>
+              </p:nextCondLst>
+            </p:seq>
+          </p:childTnLst>
+        </p:cTn>
+      </p:par>
+    </p:tnLst>
+  </p:timing>
+</p:sld>
+</file>
+
+<file path=ppt/slides/slide3.xml><?xml version="1.0" encoding="utf-8"?>
 <p:sld xmlns:a="http://schemas.openxmlformats.org/drawingml/2006/main" xmlns:r="http://schemas.openxmlformats.org/officeDocument/2006/relationships" xmlns:p="http://schemas.openxmlformats.org/presentationml/2006/main">
   <p:cSld>
     <p:spTree>
@@ -6684,7 +7276,7 @@
 </p:sld>
 </file>
 
-<file path=ppt/slides/slide3.xml><?xml version="1.0" encoding="utf-8"?>
+<file path=ppt/slides/slide4.xml><?xml version="1.0" encoding="utf-8"?>
 <p:sld xmlns:a="http://schemas.openxmlformats.org/drawingml/2006/main" xmlns:r="http://schemas.openxmlformats.org/officeDocument/2006/relationships" xmlns:p="http://schemas.openxmlformats.org/presentationml/2006/main">
   <p:cSld>
     <p:spTree>
@@ -7638,7 +8230,7 @@
 </p:sld>
 </file>
 
-<file path=ppt/slides/slide4.xml><?xml version="1.0" encoding="utf-8"?>
+<file path=ppt/slides/slide5.xml><?xml version="1.0" encoding="utf-8"?>
 <p:sld xmlns:a="http://schemas.openxmlformats.org/drawingml/2006/main" xmlns:r="http://schemas.openxmlformats.org/officeDocument/2006/relationships" xmlns:p="http://schemas.openxmlformats.org/presentationml/2006/main">
   <p:cSld>
     <p:spTree>

</xml_diff>

<commit_message>
feat(ppt filter): added property/ctor
</commit_message>
<xml_diff>
--- a/supports/source/02-FilterLambdaFctSup.pptx
+++ b/supports/source/02-FilterLambdaFctSup.pptx
@@ -6,10 +6,11 @@
   </p:sldMasterIdLst>
   <p:sldIdLst>
     <p:sldId id="256" r:id="rId2"/>
-    <p:sldId id="260" r:id="rId3"/>
-    <p:sldId id="257" r:id="rId4"/>
-    <p:sldId id="258" r:id="rId5"/>
-    <p:sldId id="259" r:id="rId6"/>
+    <p:sldId id="261" r:id="rId3"/>
+    <p:sldId id="260" r:id="rId4"/>
+    <p:sldId id="257" r:id="rId5"/>
+    <p:sldId id="258" r:id="rId6"/>
+    <p:sldId id="259" r:id="rId7"/>
   </p:sldIdLst>
   <p:sldSz cx="12192000" cy="6858000"/>
   <p:notesSz cx="6858000" cy="9144000"/>
@@ -499,7 +500,7 @@
           <a:p>
             <a:fld id="{5AEE9901-D54F-483E-910A-A3C293F4A3A0}" type="datetimeFigureOut">
               <a:rPr lang="fr-CH" smtClean="0"/>
-              <a:t>01.09.2025</a:t>
+              <a:t>03.09.2025</a:t>
             </a:fld>
             <a:endParaRPr lang="fr-CH"/>
           </a:p>
@@ -786,7 +787,7 @@
           <a:p>
             <a:fld id="{5AEE9901-D54F-483E-910A-A3C293F4A3A0}" type="datetimeFigureOut">
               <a:rPr lang="fr-CH" smtClean="0"/>
-              <a:t>01.09.2025</a:t>
+              <a:t>03.09.2025</a:t>
             </a:fld>
             <a:endParaRPr lang="fr-CH"/>
           </a:p>
@@ -978,7 +979,7 @@
           <a:p>
             <a:fld id="{5AEE9901-D54F-483E-910A-A3C293F4A3A0}" type="datetimeFigureOut">
               <a:rPr lang="fr-CH" smtClean="0"/>
-              <a:t>01.09.2025</a:t>
+              <a:t>03.09.2025</a:t>
             </a:fld>
             <a:endParaRPr lang="fr-CH"/>
           </a:p>
@@ -1239,7 +1240,7 @@
           <a:p>
             <a:fld id="{5AEE9901-D54F-483E-910A-A3C293F4A3A0}" type="datetimeFigureOut">
               <a:rPr lang="fr-CH" smtClean="0"/>
-              <a:t>01.09.2025</a:t>
+              <a:t>03.09.2025</a:t>
             </a:fld>
             <a:endParaRPr lang="fr-CH"/>
           </a:p>
@@ -1663,7 +1664,7 @@
           <a:p>
             <a:fld id="{5AEE9901-D54F-483E-910A-A3C293F4A3A0}" type="datetimeFigureOut">
               <a:rPr lang="fr-CH" smtClean="0"/>
-              <a:t>01.09.2025</a:t>
+              <a:t>03.09.2025</a:t>
             </a:fld>
             <a:endParaRPr lang="fr-CH"/>
           </a:p>
@@ -2209,7 +2210,7 @@
           <a:p>
             <a:fld id="{5AEE9901-D54F-483E-910A-A3C293F4A3A0}" type="datetimeFigureOut">
               <a:rPr lang="fr-CH" smtClean="0"/>
-              <a:t>01.09.2025</a:t>
+              <a:t>03.09.2025</a:t>
             </a:fld>
             <a:endParaRPr lang="fr-CH"/>
           </a:p>
@@ -3049,7 +3050,7 @@
           <a:p>
             <a:fld id="{5AEE9901-D54F-483E-910A-A3C293F4A3A0}" type="datetimeFigureOut">
               <a:rPr lang="fr-CH" smtClean="0"/>
-              <a:t>01.09.2025</a:t>
+              <a:t>03.09.2025</a:t>
             </a:fld>
             <a:endParaRPr lang="fr-CH"/>
           </a:p>
@@ -3219,7 +3220,7 @@
           <a:p>
             <a:fld id="{5AEE9901-D54F-483E-910A-A3C293F4A3A0}" type="datetimeFigureOut">
               <a:rPr lang="fr-CH" smtClean="0"/>
-              <a:t>01.09.2025</a:t>
+              <a:t>03.09.2025</a:t>
             </a:fld>
             <a:endParaRPr lang="fr-CH"/>
           </a:p>
@@ -3403,7 +3404,7 @@
           <a:p>
             <a:fld id="{5AEE9901-D54F-483E-910A-A3C293F4A3A0}" type="datetimeFigureOut">
               <a:rPr lang="fr-CH" smtClean="0"/>
-              <a:t>01.09.2025</a:t>
+              <a:t>03.09.2025</a:t>
             </a:fld>
             <a:endParaRPr lang="fr-CH"/>
           </a:p>
@@ -3573,7 +3574,7 @@
           <a:p>
             <a:fld id="{5AEE9901-D54F-483E-910A-A3C293F4A3A0}" type="datetimeFigureOut">
               <a:rPr lang="fr-CH" smtClean="0"/>
-              <a:t>01.09.2025</a:t>
+              <a:t>03.09.2025</a:t>
             </a:fld>
             <a:endParaRPr lang="fr-CH"/>
           </a:p>
@@ -3821,7 +3822,7 @@
           <a:p>
             <a:fld id="{5AEE9901-D54F-483E-910A-A3C293F4A3A0}" type="datetimeFigureOut">
               <a:rPr lang="fr-CH" smtClean="0"/>
-              <a:t>01.09.2025</a:t>
+              <a:t>03.09.2025</a:t>
             </a:fld>
             <a:endParaRPr lang="fr-CH"/>
           </a:p>
@@ -4058,7 +4059,7 @@
           <a:p>
             <a:fld id="{5AEE9901-D54F-483E-910A-A3C293F4A3A0}" type="datetimeFigureOut">
               <a:rPr lang="fr-CH" smtClean="0"/>
-              <a:t>01.09.2025</a:t>
+              <a:t>03.09.2025</a:t>
             </a:fld>
             <a:endParaRPr lang="fr-CH"/>
           </a:p>
@@ -4431,7 +4432,7 @@
           <a:p>
             <a:fld id="{5AEE9901-D54F-483E-910A-A3C293F4A3A0}" type="datetimeFigureOut">
               <a:rPr lang="fr-CH" smtClean="0"/>
-              <a:t>01.09.2025</a:t>
+              <a:t>03.09.2025</a:t>
             </a:fld>
             <a:endParaRPr lang="fr-CH"/>
           </a:p>
@@ -4549,7 +4550,7 @@
           <a:p>
             <a:fld id="{5AEE9901-D54F-483E-910A-A3C293F4A3A0}" type="datetimeFigureOut">
               <a:rPr lang="fr-CH" smtClean="0"/>
-              <a:t>01.09.2025</a:t>
+              <a:t>03.09.2025</a:t>
             </a:fld>
             <a:endParaRPr lang="fr-CH"/>
           </a:p>
@@ -4644,7 +4645,7 @@
           <a:p>
             <a:fld id="{5AEE9901-D54F-483E-910A-A3C293F4A3A0}" type="datetimeFigureOut">
               <a:rPr lang="fr-CH" smtClean="0"/>
-              <a:t>01.09.2025</a:t>
+              <a:t>03.09.2025</a:t>
             </a:fld>
             <a:endParaRPr lang="fr-CH"/>
           </a:p>
@@ -4895,7 +4896,7 @@
           <a:p>
             <a:fld id="{5AEE9901-D54F-483E-910A-A3C293F4A3A0}" type="datetimeFigureOut">
               <a:rPr lang="fr-CH" smtClean="0"/>
-              <a:t>01.09.2025</a:t>
+              <a:t>03.09.2025</a:t>
             </a:fld>
             <a:endParaRPr lang="fr-CH"/>
           </a:p>
@@ -5182,7 +5183,7 @@
           <a:p>
             <a:fld id="{5AEE9901-D54F-483E-910A-A3C293F4A3A0}" type="datetimeFigureOut">
               <a:rPr lang="fr-CH" smtClean="0"/>
-              <a:t>01.09.2025</a:t>
+              <a:t>03.09.2025</a:t>
             </a:fld>
             <a:endParaRPr lang="fr-CH"/>
           </a:p>
@@ -5395,7 +5396,7 @@
           <a:p>
             <a:fld id="{5AEE9901-D54F-483E-910A-A3C293F4A3A0}" type="datetimeFigureOut">
               <a:rPr lang="fr-CH" smtClean="0"/>
-              <a:t>01.09.2025</a:t>
+              <a:t>03.09.2025</a:t>
             </a:fld>
             <a:endParaRPr lang="fr-CH"/>
           </a:p>
@@ -5946,6 +5947,544 @@
 </file>
 
 <file path=ppt/slides/slide2.xml><?xml version="1.0" encoding="utf-8"?>
+<p:sld xmlns:a="http://schemas.openxmlformats.org/drawingml/2006/main" xmlns:r="http://schemas.openxmlformats.org/officeDocument/2006/relationships" xmlns:p="http://schemas.openxmlformats.org/presentationml/2006/main">
+  <p:cSld>
+    <p:spTree>
+      <p:nvGrpSpPr>
+        <p:cNvPr id="1" name=""/>
+        <p:cNvGrpSpPr/>
+        <p:nvPr/>
+      </p:nvGrpSpPr>
+      <p:grpSpPr>
+        <a:xfrm>
+          <a:off x="0" y="0"/>
+          <a:ext cx="0" cy="0"/>
+          <a:chOff x="0" y="0"/>
+          <a:chExt cx="0" cy="0"/>
+        </a:xfrm>
+      </p:grpSpPr>
+      <p:sp>
+        <p:nvSpPr>
+          <p:cNvPr id="2" name="Titre 1">
+            <a:extLst>
+              <a:ext uri="{FF2B5EF4-FFF2-40B4-BE49-F238E27FC236}">
+                <a16:creationId xmlns:a16="http://schemas.microsoft.com/office/drawing/2014/main" id="{8AD4D18B-E209-9CD6-A2F8-A323244539C0}"/>
+              </a:ext>
+            </a:extLst>
+          </p:cNvPr>
+          <p:cNvSpPr>
+            <a:spLocks noGrp="1"/>
+          </p:cNvSpPr>
+          <p:nvPr>
+            <p:ph type="title"/>
+          </p:nvPr>
+        </p:nvSpPr>
+        <p:spPr/>
+        <p:txBody>
+          <a:bodyPr/>
+          <a:lstStyle/>
+          <a:p>
+            <a:r>
+              <a:rPr lang="fr-CH" dirty="0"/>
+              <a:t>Rappel sur les classes</a:t>
+            </a:r>
+          </a:p>
+        </p:txBody>
+      </p:sp>
+      <p:sp>
+        <p:nvSpPr>
+          <p:cNvPr id="3" name="Espace réservé du contenu 2">
+            <a:extLst>
+              <a:ext uri="{FF2B5EF4-FFF2-40B4-BE49-F238E27FC236}">
+                <a16:creationId xmlns:a16="http://schemas.microsoft.com/office/drawing/2014/main" id="{E31CCDE9-E977-CDC7-14CD-6FA76DA04FB9}"/>
+              </a:ext>
+            </a:extLst>
+          </p:cNvPr>
+          <p:cNvSpPr>
+            <a:spLocks noGrp="1"/>
+          </p:cNvSpPr>
+          <p:nvPr>
+            <p:ph idx="1"/>
+          </p:nvPr>
+        </p:nvSpPr>
+        <p:spPr/>
+        <p:txBody>
+          <a:bodyPr/>
+          <a:lstStyle/>
+          <a:p>
+            <a:r>
+              <a:rPr lang="fr-CH" dirty="0"/>
+              <a:t>Propriété</a:t>
+            </a:r>
+          </a:p>
+          <a:p>
+            <a:endParaRPr lang="fr-CH" dirty="0"/>
+          </a:p>
+          <a:p>
+            <a:endParaRPr lang="fr-CH" dirty="0"/>
+          </a:p>
+          <a:p>
+            <a:endParaRPr lang="fr-CH" dirty="0"/>
+          </a:p>
+          <a:p>
+            <a:r>
+              <a:rPr lang="fr-CH" dirty="0"/>
+              <a:t>Propriété avec implémentation</a:t>
+            </a:r>
+          </a:p>
+        </p:txBody>
+      </p:sp>
+      <p:pic>
+        <p:nvPicPr>
+          <p:cNvPr id="7" name="Image 6">
+            <a:extLst>
+              <a:ext uri="{FF2B5EF4-FFF2-40B4-BE49-F238E27FC236}">
+                <a16:creationId xmlns:a16="http://schemas.microsoft.com/office/drawing/2014/main" id="{97CBBF9B-7858-028A-D33D-961746982092}"/>
+              </a:ext>
+            </a:extLst>
+          </p:cNvPr>
+          <p:cNvPicPr>
+            <a:picLocks noChangeAspect="1"/>
+          </p:cNvPicPr>
+          <p:nvPr/>
+        </p:nvPicPr>
+        <p:blipFill>
+          <a:blip r:embed="rId2"/>
+          <a:stretch>
+            <a:fillRect/>
+          </a:stretch>
+        </p:blipFill>
+        <p:spPr>
+          <a:xfrm>
+            <a:off x="1086650" y="2653395"/>
+            <a:ext cx="3688550" cy="1354152"/>
+          </a:xfrm>
+          <a:prstGeom prst="rect">
+            <a:avLst/>
+          </a:prstGeom>
+        </p:spPr>
+      </p:pic>
+      <p:pic>
+        <p:nvPicPr>
+          <p:cNvPr id="9" name="Image 8">
+            <a:extLst>
+              <a:ext uri="{FF2B5EF4-FFF2-40B4-BE49-F238E27FC236}">
+                <a16:creationId xmlns:a16="http://schemas.microsoft.com/office/drawing/2014/main" id="{941880F9-48CE-E457-59F6-AD93534F0E99}"/>
+              </a:ext>
+            </a:extLst>
+          </p:cNvPr>
+          <p:cNvPicPr>
+            <a:picLocks noChangeAspect="1"/>
+          </p:cNvPicPr>
+          <p:nvPr/>
+        </p:nvPicPr>
+        <p:blipFill>
+          <a:blip r:embed="rId3"/>
+          <a:stretch>
+            <a:fillRect/>
+          </a:stretch>
+        </p:blipFill>
+        <p:spPr>
+          <a:xfrm>
+            <a:off x="1086650" y="4663445"/>
+            <a:ext cx="3688550" cy="2019582"/>
+          </a:xfrm>
+          <a:prstGeom prst="rect">
+            <a:avLst/>
+          </a:prstGeom>
+        </p:spPr>
+      </p:pic>
+      <p:pic>
+        <p:nvPicPr>
+          <p:cNvPr id="11" name="Image 10">
+            <a:extLst>
+              <a:ext uri="{FF2B5EF4-FFF2-40B4-BE49-F238E27FC236}">
+                <a16:creationId xmlns:a16="http://schemas.microsoft.com/office/drawing/2014/main" id="{ADC30B10-499C-3140-F9B8-82E065443C1C}"/>
+              </a:ext>
+            </a:extLst>
+          </p:cNvPr>
+          <p:cNvPicPr>
+            <a:picLocks noChangeAspect="1"/>
+          </p:cNvPicPr>
+          <p:nvPr/>
+        </p:nvPicPr>
+        <p:blipFill>
+          <a:blip r:embed="rId4"/>
+          <a:stretch>
+            <a:fillRect/>
+          </a:stretch>
+        </p:blipFill>
+        <p:spPr>
+          <a:xfrm>
+            <a:off x="5231533" y="3631421"/>
+            <a:ext cx="6665661" cy="1032024"/>
+          </a:xfrm>
+          <a:prstGeom prst="rect">
+            <a:avLst/>
+          </a:prstGeom>
+        </p:spPr>
+      </p:pic>
+      <p:sp>
+        <p:nvSpPr>
+          <p:cNvPr id="12" name="ZoneTexte 11">
+            <a:extLst>
+              <a:ext uri="{FF2B5EF4-FFF2-40B4-BE49-F238E27FC236}">
+                <a16:creationId xmlns:a16="http://schemas.microsoft.com/office/drawing/2014/main" id="{EE7459C5-7833-5D51-BEFC-A6D3F17712EB}"/>
+              </a:ext>
+            </a:extLst>
+          </p:cNvPr>
+          <p:cNvSpPr txBox="1"/>
+          <p:nvPr/>
+        </p:nvSpPr>
+        <p:spPr>
+          <a:xfrm>
+            <a:off x="5231533" y="3180739"/>
+            <a:ext cx="2702560" cy="369332"/>
+          </a:xfrm>
+          <a:prstGeom prst="rect">
+            <a:avLst/>
+          </a:prstGeom>
+          <a:noFill/>
+        </p:spPr>
+        <p:txBody>
+          <a:bodyPr wrap="square" rtlCol="0">
+            <a:spAutoFit/>
+          </a:bodyPr>
+          <a:lstStyle/>
+          <a:p>
+            <a:r>
+              <a:rPr lang="fr-CH" dirty="0"/>
+              <a:t>Constructeur</a:t>
+            </a:r>
+          </a:p>
+        </p:txBody>
+      </p:sp>
+    </p:spTree>
+    <p:extLst>
+      <p:ext uri="{BB962C8B-B14F-4D97-AF65-F5344CB8AC3E}">
+        <p14:creationId xmlns:p14="http://schemas.microsoft.com/office/powerpoint/2010/main" val="3994984447"/>
+      </p:ext>
+    </p:extLst>
+  </p:cSld>
+  <p:clrMapOvr>
+    <a:masterClrMapping/>
+  </p:clrMapOvr>
+  <p:timing>
+    <p:tnLst>
+      <p:par>
+        <p:cTn id="1" dur="indefinite" restart="never" nodeType="tmRoot">
+          <p:childTnLst>
+            <p:seq concurrent="1" nextAc="seek">
+              <p:cTn id="2" dur="indefinite" nodeType="mainSeq">
+                <p:childTnLst>
+                  <p:par>
+                    <p:cTn id="3" fill="hold">
+                      <p:stCondLst>
+                        <p:cond delay="indefinite"/>
+                      </p:stCondLst>
+                      <p:childTnLst>
+                        <p:par>
+                          <p:cTn id="4" fill="hold">
+                            <p:stCondLst>
+                              <p:cond delay="0"/>
+                            </p:stCondLst>
+                            <p:childTnLst>
+                              <p:par>
+                                <p:cTn id="5" presetID="1" presetClass="entr" presetSubtype="0" fill="hold" grpId="0" nodeType="clickEffect">
+                                  <p:stCondLst>
+                                    <p:cond delay="0"/>
+                                  </p:stCondLst>
+                                  <p:childTnLst>
+                                    <p:set>
+                                      <p:cBhvr>
+                                        <p:cTn id="6" dur="1" fill="hold">
+                                          <p:stCondLst>
+                                            <p:cond delay="0"/>
+                                          </p:stCondLst>
+                                        </p:cTn>
+                                        <p:tgtEl>
+                                          <p:spTgt spid="3">
+                                            <p:txEl>
+                                              <p:pRg st="0" end="0"/>
+                                            </p:txEl>
+                                          </p:spTgt>
+                                        </p:tgtEl>
+                                        <p:attrNameLst>
+                                          <p:attrName>style.visibility</p:attrName>
+                                        </p:attrNameLst>
+                                      </p:cBhvr>
+                                      <p:to>
+                                        <p:strVal val="visible"/>
+                                      </p:to>
+                                    </p:set>
+                                  </p:childTnLst>
+                                </p:cTn>
+                              </p:par>
+                            </p:childTnLst>
+                          </p:cTn>
+                        </p:par>
+                      </p:childTnLst>
+                    </p:cTn>
+                  </p:par>
+                  <p:par>
+                    <p:cTn id="7" fill="hold">
+                      <p:stCondLst>
+                        <p:cond delay="indefinite"/>
+                      </p:stCondLst>
+                      <p:childTnLst>
+                        <p:par>
+                          <p:cTn id="8" fill="hold">
+                            <p:stCondLst>
+                              <p:cond delay="0"/>
+                            </p:stCondLst>
+                            <p:childTnLst>
+                              <p:par>
+                                <p:cTn id="9" presetID="1" presetClass="entr" presetSubtype="0" fill="hold" nodeType="clickEffect">
+                                  <p:stCondLst>
+                                    <p:cond delay="0"/>
+                                  </p:stCondLst>
+                                  <p:childTnLst>
+                                    <p:set>
+                                      <p:cBhvr>
+                                        <p:cTn id="10" dur="1" fill="hold">
+                                          <p:stCondLst>
+                                            <p:cond delay="0"/>
+                                          </p:stCondLst>
+                                        </p:cTn>
+                                        <p:tgtEl>
+                                          <p:spTgt spid="7"/>
+                                        </p:tgtEl>
+                                        <p:attrNameLst>
+                                          <p:attrName>style.visibility</p:attrName>
+                                        </p:attrNameLst>
+                                      </p:cBhvr>
+                                      <p:to>
+                                        <p:strVal val="visible"/>
+                                      </p:to>
+                                    </p:set>
+                                  </p:childTnLst>
+                                </p:cTn>
+                              </p:par>
+                            </p:childTnLst>
+                          </p:cTn>
+                        </p:par>
+                      </p:childTnLst>
+                    </p:cTn>
+                  </p:par>
+                  <p:par>
+                    <p:cTn id="11" fill="hold">
+                      <p:stCondLst>
+                        <p:cond delay="indefinite"/>
+                      </p:stCondLst>
+                      <p:childTnLst>
+                        <p:par>
+                          <p:cTn id="12" fill="hold">
+                            <p:stCondLst>
+                              <p:cond delay="0"/>
+                            </p:stCondLst>
+                            <p:childTnLst>
+                              <p:par>
+                                <p:cTn id="13" presetID="1" presetClass="entr" presetSubtype="0" fill="hold" grpId="0" nodeType="clickEffect">
+                                  <p:stCondLst>
+                                    <p:cond delay="0"/>
+                                  </p:stCondLst>
+                                  <p:childTnLst>
+                                    <p:set>
+                                      <p:cBhvr>
+                                        <p:cTn id="14" dur="1" fill="hold">
+                                          <p:stCondLst>
+                                            <p:cond delay="0"/>
+                                          </p:stCondLst>
+                                        </p:cTn>
+                                        <p:tgtEl>
+                                          <p:spTgt spid="3">
+                                            <p:txEl>
+                                              <p:pRg st="4" end="4"/>
+                                            </p:txEl>
+                                          </p:spTgt>
+                                        </p:tgtEl>
+                                        <p:attrNameLst>
+                                          <p:attrName>style.visibility</p:attrName>
+                                        </p:attrNameLst>
+                                      </p:cBhvr>
+                                      <p:to>
+                                        <p:strVal val="visible"/>
+                                      </p:to>
+                                    </p:set>
+                                  </p:childTnLst>
+                                </p:cTn>
+                              </p:par>
+                            </p:childTnLst>
+                          </p:cTn>
+                        </p:par>
+                      </p:childTnLst>
+                    </p:cTn>
+                  </p:par>
+                  <p:par>
+                    <p:cTn id="15" fill="hold">
+                      <p:stCondLst>
+                        <p:cond delay="indefinite"/>
+                      </p:stCondLst>
+                      <p:childTnLst>
+                        <p:par>
+                          <p:cTn id="16" fill="hold">
+                            <p:stCondLst>
+                              <p:cond delay="0"/>
+                            </p:stCondLst>
+                            <p:childTnLst>
+                              <p:par>
+                                <p:cTn id="17" presetID="1" presetClass="entr" presetSubtype="0" fill="hold" nodeType="clickEffect">
+                                  <p:stCondLst>
+                                    <p:cond delay="0"/>
+                                  </p:stCondLst>
+                                  <p:childTnLst>
+                                    <p:set>
+                                      <p:cBhvr>
+                                        <p:cTn id="18" dur="1" fill="hold">
+                                          <p:stCondLst>
+                                            <p:cond delay="0"/>
+                                          </p:stCondLst>
+                                        </p:cTn>
+                                        <p:tgtEl>
+                                          <p:spTgt spid="9"/>
+                                        </p:tgtEl>
+                                        <p:attrNameLst>
+                                          <p:attrName>style.visibility</p:attrName>
+                                        </p:attrNameLst>
+                                      </p:cBhvr>
+                                      <p:to>
+                                        <p:strVal val="visible"/>
+                                      </p:to>
+                                    </p:set>
+                                  </p:childTnLst>
+                                </p:cTn>
+                              </p:par>
+                            </p:childTnLst>
+                          </p:cTn>
+                        </p:par>
+                      </p:childTnLst>
+                    </p:cTn>
+                  </p:par>
+                  <p:par>
+                    <p:cTn id="19" fill="hold">
+                      <p:stCondLst>
+                        <p:cond delay="indefinite"/>
+                      </p:stCondLst>
+                      <p:childTnLst>
+                        <p:par>
+                          <p:cTn id="20" fill="hold">
+                            <p:stCondLst>
+                              <p:cond delay="0"/>
+                            </p:stCondLst>
+                            <p:childTnLst>
+                              <p:par>
+                                <p:cTn id="21" presetID="1" presetClass="entr" presetSubtype="0" fill="hold" grpId="0" nodeType="clickEffect">
+                                  <p:stCondLst>
+                                    <p:cond delay="0"/>
+                                  </p:stCondLst>
+                                  <p:childTnLst>
+                                    <p:set>
+                                      <p:cBhvr>
+                                        <p:cTn id="22" dur="1" fill="hold">
+                                          <p:stCondLst>
+                                            <p:cond delay="0"/>
+                                          </p:stCondLst>
+                                        </p:cTn>
+                                        <p:tgtEl>
+                                          <p:spTgt spid="12"/>
+                                        </p:tgtEl>
+                                        <p:attrNameLst>
+                                          <p:attrName>style.visibility</p:attrName>
+                                        </p:attrNameLst>
+                                      </p:cBhvr>
+                                      <p:to>
+                                        <p:strVal val="visible"/>
+                                      </p:to>
+                                    </p:set>
+                                  </p:childTnLst>
+                                </p:cTn>
+                              </p:par>
+                            </p:childTnLst>
+                          </p:cTn>
+                        </p:par>
+                      </p:childTnLst>
+                    </p:cTn>
+                  </p:par>
+                  <p:par>
+                    <p:cTn id="23" fill="hold">
+                      <p:stCondLst>
+                        <p:cond delay="indefinite"/>
+                      </p:stCondLst>
+                      <p:childTnLst>
+                        <p:par>
+                          <p:cTn id="24" fill="hold">
+                            <p:stCondLst>
+                              <p:cond delay="0"/>
+                            </p:stCondLst>
+                            <p:childTnLst>
+                              <p:par>
+                                <p:cTn id="25" presetID="1" presetClass="entr" presetSubtype="0" fill="hold" nodeType="clickEffect">
+                                  <p:stCondLst>
+                                    <p:cond delay="0"/>
+                                  </p:stCondLst>
+                                  <p:childTnLst>
+                                    <p:set>
+                                      <p:cBhvr>
+                                        <p:cTn id="26" dur="1" fill="hold">
+                                          <p:stCondLst>
+                                            <p:cond delay="0"/>
+                                          </p:stCondLst>
+                                        </p:cTn>
+                                        <p:tgtEl>
+                                          <p:spTgt spid="11"/>
+                                        </p:tgtEl>
+                                        <p:attrNameLst>
+                                          <p:attrName>style.visibility</p:attrName>
+                                        </p:attrNameLst>
+                                      </p:cBhvr>
+                                      <p:to>
+                                        <p:strVal val="visible"/>
+                                      </p:to>
+                                    </p:set>
+                                  </p:childTnLst>
+                                </p:cTn>
+                              </p:par>
+                            </p:childTnLst>
+                          </p:cTn>
+                        </p:par>
+                      </p:childTnLst>
+                    </p:cTn>
+                  </p:par>
+                </p:childTnLst>
+              </p:cTn>
+              <p:prevCondLst>
+                <p:cond evt="onPrev" delay="0">
+                  <p:tgtEl>
+                    <p:sldTgt/>
+                  </p:tgtEl>
+                </p:cond>
+              </p:prevCondLst>
+              <p:nextCondLst>
+                <p:cond evt="onNext" delay="0">
+                  <p:tgtEl>
+                    <p:sldTgt/>
+                  </p:tgtEl>
+                </p:cond>
+              </p:nextCondLst>
+            </p:seq>
+          </p:childTnLst>
+        </p:cTn>
+      </p:par>
+    </p:tnLst>
+    <p:bldLst>
+      <p:bldP spid="3" grpId="0" uiExpand="1" build="p"/>
+      <p:bldP spid="12" grpId="0"/>
+    </p:bldLst>
+  </p:timing>
+</p:sld>
+</file>
+
+<file path=ppt/slides/slide3.xml><?xml version="1.0" encoding="utf-8"?>
 <p:sld xmlns:a="http://schemas.openxmlformats.org/drawingml/2006/main" xmlns:r="http://schemas.openxmlformats.org/officeDocument/2006/relationships" xmlns:p="http://schemas.openxmlformats.org/presentationml/2006/main">
   <p:cSld>
     <p:spTree>
@@ -6531,7 +7070,7 @@
 </p:sld>
 </file>
 
-<file path=ppt/slides/slide3.xml><?xml version="1.0" encoding="utf-8"?>
+<file path=ppt/slides/slide4.xml><?xml version="1.0" encoding="utf-8"?>
 <p:sld xmlns:a="http://schemas.openxmlformats.org/drawingml/2006/main" xmlns:r="http://schemas.openxmlformats.org/officeDocument/2006/relationships" xmlns:p="http://schemas.openxmlformats.org/presentationml/2006/main">
   <p:cSld>
     <p:spTree>
@@ -7276,7 +7815,7 @@
 </p:sld>
 </file>
 
-<file path=ppt/slides/slide4.xml><?xml version="1.0" encoding="utf-8"?>
+<file path=ppt/slides/slide5.xml><?xml version="1.0" encoding="utf-8"?>
 <p:sld xmlns:a="http://schemas.openxmlformats.org/drawingml/2006/main" xmlns:r="http://schemas.openxmlformats.org/officeDocument/2006/relationships" xmlns:p="http://schemas.openxmlformats.org/presentationml/2006/main">
   <p:cSld>
     <p:spTree>
@@ -8230,7 +8769,7 @@
 </p:sld>
 </file>
 
-<file path=ppt/slides/slide5.xml><?xml version="1.0" encoding="utf-8"?>
+<file path=ppt/slides/slide6.xml><?xml version="1.0" encoding="utf-8"?>
 <p:sld xmlns:a="http://schemas.openxmlformats.org/drawingml/2006/main" xmlns:r="http://schemas.openxmlformats.org/officeDocument/2006/relationships" xmlns:p="http://schemas.openxmlformats.org/presentationml/2006/main">
   <p:cSld>
     <p:spTree>

</xml_diff>